<commit_message>
Added draft slides presentation
</commit_message>
<xml_diff>
--- a/4_Presentation/Präsentation_Raum3.pptx
+++ b/4_Presentation/Präsentation_Raum3.pptx
@@ -8,10 +8,11 @@
     <p:sldId id="256" r:id="rId2"/>
     <p:sldId id="257" r:id="rId3"/>
     <p:sldId id="258" r:id="rId4"/>
-    <p:sldId id="259" r:id="rId5"/>
-    <p:sldId id="260" r:id="rId6"/>
-    <p:sldId id="261" r:id="rId7"/>
-    <p:sldId id="262" r:id="rId8"/>
+    <p:sldId id="263" r:id="rId5"/>
+    <p:sldId id="259" r:id="rId6"/>
+    <p:sldId id="260" r:id="rId7"/>
+    <p:sldId id="261" r:id="rId8"/>
+    <p:sldId id="262" r:id="rId9"/>
   </p:sldIdLst>
   <p:sldSz cx="12192000" cy="6858000"/>
   <p:notesSz cx="6858000" cy="9144000"/>
@@ -110,6 +111,11 @@
       </a:defRPr>
     </a:lvl9pPr>
   </p:defaultTextStyle>
+  <p:extLst>
+    <p:ext uri="{EFAFB233-063F-42B5-8137-9DF3F51BA10A}">
+      <p15:sldGuideLst xmlns:p15="http://schemas.microsoft.com/office/powerpoint/2012/main"/>
+    </p:ext>
+  </p:extLst>
 </p:presentation>
 </file>
 
@@ -163,7 +169,7 @@
           <a:noFill/>
           <a:extLst>
             <a:ext uri="{909E8E84-426E-40dd-AFC4-6F175D3DCCD1}">
-              <a14:hiddenFill xmlns:a14="http://schemas.microsoft.com/office/drawing/2010/main" xmlns="">
+              <a14:hiddenFill xmlns="" xmlns:a14="http://schemas.microsoft.com/office/drawing/2010/main">
                 <a:solidFill>
                   <a:srgbClr val="FFFFFF"/>
                 </a:solidFill>
@@ -223,7 +229,7 @@
             </a:ln>
             <a:extLst>
               <a:ext uri="{91240B29-F687-4f45-9708-019B960494DF}">
-                <a14:hiddenLine xmlns:a14="http://schemas.microsoft.com/office/drawing/2010/main" xmlns="" w="9525">
+                <a14:hiddenLine xmlns="" xmlns:a14="http://schemas.microsoft.com/office/drawing/2010/main" w="9525">
                   <a:solidFill>
                     <a:srgbClr val="000000"/>
                   </a:solidFill>
@@ -313,7 +319,7 @@
             </a:ln>
             <a:extLst>
               <a:ext uri="{91240B29-F687-4f45-9708-019B960494DF}">
-                <a14:hiddenLine xmlns:a14="http://schemas.microsoft.com/office/drawing/2010/main" xmlns="" w="9525">
+                <a14:hiddenLine xmlns="" xmlns:a14="http://schemas.microsoft.com/office/drawing/2010/main" w="9525">
                   <a:solidFill>
                     <a:srgbClr val="000000"/>
                   </a:solidFill>
@@ -403,7 +409,7 @@
             </a:ln>
             <a:extLst>
               <a:ext uri="{91240B29-F687-4f45-9708-019B960494DF}">
-                <a14:hiddenLine xmlns:a14="http://schemas.microsoft.com/office/drawing/2010/main" xmlns="" w="9525">
+                <a14:hiddenLine xmlns="" xmlns:a14="http://schemas.microsoft.com/office/drawing/2010/main" w="9525">
                   <a:solidFill>
                     <a:srgbClr val="000000"/>
                   </a:solidFill>
@@ -437,7 +443,7 @@
             </a:ln>
             <a:extLst>
               <a:ext uri="{91240B29-F687-4f45-9708-019B960494DF}">
-                <a14:hiddenLine xmlns:a14="http://schemas.microsoft.com/office/drawing/2010/main" xmlns="" w="9525">
+                <a14:hiddenLine xmlns="" xmlns:a14="http://schemas.microsoft.com/office/drawing/2010/main" w="9525">
                   <a:solidFill>
                     <a:srgbClr val="000000"/>
                   </a:solidFill>
@@ -527,7 +533,7 @@
             </a:ln>
             <a:extLst>
               <a:ext uri="{91240B29-F687-4f45-9708-019B960494DF}">
-                <a14:hiddenLine xmlns:a14="http://schemas.microsoft.com/office/drawing/2010/main" xmlns="" w="9525">
+                <a14:hiddenLine xmlns="" xmlns:a14="http://schemas.microsoft.com/office/drawing/2010/main" w="9525">
                   <a:solidFill>
                     <a:srgbClr val="000000"/>
                   </a:solidFill>
@@ -589,7 +595,7 @@
             </a:ln>
             <a:extLst>
               <a:ext uri="{91240B29-F687-4f45-9708-019B960494DF}">
-                <a14:hiddenLine xmlns:a14="http://schemas.microsoft.com/office/drawing/2010/main" xmlns="" w="9525">
+                <a14:hiddenLine xmlns="" xmlns:a14="http://schemas.microsoft.com/office/drawing/2010/main" w="9525">
                   <a:solidFill>
                     <a:srgbClr val="000000"/>
                   </a:solidFill>
@@ -651,7 +657,7 @@
             </a:ln>
             <a:extLst>
               <a:ext uri="{91240B29-F687-4f45-9708-019B960494DF}">
-                <a14:hiddenLine xmlns:a14="http://schemas.microsoft.com/office/drawing/2010/main" xmlns="" w="9525">
+                <a14:hiddenLine xmlns="" xmlns:a14="http://schemas.microsoft.com/office/drawing/2010/main" w="9525">
                   <a:solidFill>
                     <a:srgbClr val="000000"/>
                   </a:solidFill>
@@ -741,7 +747,7 @@
             </a:ln>
             <a:extLst>
               <a:ext uri="{91240B29-F687-4f45-9708-019B960494DF}">
-                <a14:hiddenLine xmlns:a14="http://schemas.microsoft.com/office/drawing/2010/main" xmlns="" w="9525">
+                <a14:hiddenLine xmlns="" xmlns:a14="http://schemas.microsoft.com/office/drawing/2010/main" w="9525">
                   <a:solidFill>
                     <a:srgbClr val="000000"/>
                   </a:solidFill>
@@ -803,7 +809,7 @@
             </a:ln>
             <a:extLst>
               <a:ext uri="{91240B29-F687-4f45-9708-019B960494DF}">
-                <a14:hiddenLine xmlns:a14="http://schemas.microsoft.com/office/drawing/2010/main" xmlns="" w="9525">
+                <a14:hiddenLine xmlns="" xmlns:a14="http://schemas.microsoft.com/office/drawing/2010/main" w="9525">
                   <a:solidFill>
                     <a:srgbClr val="000000"/>
                   </a:solidFill>
@@ -865,7 +871,7 @@
             </a:ln>
             <a:extLst>
               <a:ext uri="{91240B29-F687-4f45-9708-019B960494DF}">
-                <a14:hiddenLine xmlns:a14="http://schemas.microsoft.com/office/drawing/2010/main" xmlns="" w="9525">
+                <a14:hiddenLine xmlns="" xmlns:a14="http://schemas.microsoft.com/office/drawing/2010/main" w="9525">
                   <a:solidFill>
                     <a:srgbClr val="000000"/>
                   </a:solidFill>
@@ -955,7 +961,7 @@
             </a:ln>
             <a:extLst>
               <a:ext uri="{91240B29-F687-4f45-9708-019B960494DF}">
-                <a14:hiddenLine xmlns:a14="http://schemas.microsoft.com/office/drawing/2010/main" xmlns="" w="9525">
+                <a14:hiddenLine xmlns="" xmlns:a14="http://schemas.microsoft.com/office/drawing/2010/main" w="9525">
                   <a:solidFill>
                     <a:srgbClr val="000000"/>
                   </a:solidFill>
@@ -1045,7 +1051,7 @@
             </a:ln>
             <a:extLst>
               <a:ext uri="{91240B29-F687-4f45-9708-019B960494DF}">
-                <a14:hiddenLine xmlns:a14="http://schemas.microsoft.com/office/drawing/2010/main" xmlns="" w="9525">
+                <a14:hiddenLine xmlns="" xmlns:a14="http://schemas.microsoft.com/office/drawing/2010/main" w="9525">
                   <a:solidFill>
                     <a:srgbClr val="000000"/>
                   </a:solidFill>
@@ -1107,7 +1113,7 @@
             </a:ln>
             <a:extLst>
               <a:ext uri="{91240B29-F687-4f45-9708-019B960494DF}">
-                <a14:hiddenLine xmlns:a14="http://schemas.microsoft.com/office/drawing/2010/main" xmlns="" w="9525">
+                <a14:hiddenLine xmlns="" xmlns:a14="http://schemas.microsoft.com/office/drawing/2010/main" w="9525">
                   <a:solidFill>
                     <a:srgbClr val="000000"/>
                   </a:solidFill>
@@ -1217,7 +1223,7 @@
             </a:ln>
             <a:extLst>
               <a:ext uri="{91240B29-F687-4f45-9708-019B960494DF}">
-                <a14:hiddenLine xmlns:a14="http://schemas.microsoft.com/office/drawing/2010/main" xmlns="" w="9525">
+                <a14:hiddenLine xmlns="" xmlns:a14="http://schemas.microsoft.com/office/drawing/2010/main" w="9525">
                   <a:solidFill>
                     <a:srgbClr val="000000"/>
                   </a:solidFill>
@@ -1279,7 +1285,7 @@
             </a:ln>
             <a:extLst>
               <a:ext uri="{91240B29-F687-4f45-9708-019B960494DF}">
-                <a14:hiddenLine xmlns:a14="http://schemas.microsoft.com/office/drawing/2010/main" xmlns="" w="9525">
+                <a14:hiddenLine xmlns="" xmlns:a14="http://schemas.microsoft.com/office/drawing/2010/main" w="9525">
                   <a:solidFill>
                     <a:srgbClr val="000000"/>
                   </a:solidFill>
@@ -1369,7 +1375,7 @@
             </a:ln>
             <a:extLst>
               <a:ext uri="{91240B29-F687-4f45-9708-019B960494DF}">
-                <a14:hiddenLine xmlns:a14="http://schemas.microsoft.com/office/drawing/2010/main" xmlns="" w="9525">
+                <a14:hiddenLine xmlns="" xmlns:a14="http://schemas.microsoft.com/office/drawing/2010/main" w="9525">
                   <a:solidFill>
                     <a:srgbClr val="000000"/>
                   </a:solidFill>
@@ -1459,7 +1465,7 @@
             </a:ln>
             <a:extLst>
               <a:ext uri="{91240B29-F687-4f45-9708-019B960494DF}">
-                <a14:hiddenLine xmlns:a14="http://schemas.microsoft.com/office/drawing/2010/main" xmlns="" w="9525">
+                <a14:hiddenLine xmlns="" xmlns:a14="http://schemas.microsoft.com/office/drawing/2010/main" w="9525">
                   <a:solidFill>
                     <a:srgbClr val="000000"/>
                   </a:solidFill>
@@ -1521,7 +1527,7 @@
             </a:ln>
             <a:extLst>
               <a:ext uri="{91240B29-F687-4f45-9708-019B960494DF}">
-                <a14:hiddenLine xmlns:a14="http://schemas.microsoft.com/office/drawing/2010/main" xmlns="" w="9525">
+                <a14:hiddenLine xmlns="" xmlns:a14="http://schemas.microsoft.com/office/drawing/2010/main" w="9525">
                   <a:solidFill>
                     <a:srgbClr val="000000"/>
                   </a:solidFill>
@@ -1611,7 +1617,7 @@
             </a:ln>
             <a:extLst>
               <a:ext uri="{91240B29-F687-4f45-9708-019B960494DF}">
-                <a14:hiddenLine xmlns:a14="http://schemas.microsoft.com/office/drawing/2010/main" xmlns="" w="9525">
+                <a14:hiddenLine xmlns="" xmlns:a14="http://schemas.microsoft.com/office/drawing/2010/main" w="9525">
                   <a:solidFill>
                     <a:srgbClr val="000000"/>
                   </a:solidFill>
@@ -1701,7 +1707,7 @@
             </a:ln>
             <a:extLst>
               <a:ext uri="{91240B29-F687-4f45-9708-019B960494DF}">
-                <a14:hiddenLine xmlns:a14="http://schemas.microsoft.com/office/drawing/2010/main" xmlns="" w="9525">
+                <a14:hiddenLine xmlns="" xmlns:a14="http://schemas.microsoft.com/office/drawing/2010/main" w="9525">
                   <a:solidFill>
                     <a:srgbClr val="000000"/>
                   </a:solidFill>
@@ -1757,7 +1763,7 @@
             </a:ln>
             <a:extLst>
               <a:ext uri="{91240B29-F687-4f45-9708-019B960494DF}">
-                <a14:hiddenLine xmlns:a14="http://schemas.microsoft.com/office/drawing/2010/main" xmlns="" w="9525">
+                <a14:hiddenLine xmlns="" xmlns:a14="http://schemas.microsoft.com/office/drawing/2010/main" w="9525">
                   <a:solidFill>
                     <a:srgbClr val="000000"/>
                   </a:solidFill>
@@ -1847,7 +1853,7 @@
             </a:ln>
             <a:extLst>
               <a:ext uri="{91240B29-F687-4f45-9708-019B960494DF}">
-                <a14:hiddenLine xmlns:a14="http://schemas.microsoft.com/office/drawing/2010/main" xmlns="" w="9525">
+                <a14:hiddenLine xmlns="" xmlns:a14="http://schemas.microsoft.com/office/drawing/2010/main" w="9525">
                   <a:solidFill>
                     <a:srgbClr val="000000"/>
                   </a:solidFill>
@@ -1903,7 +1909,7 @@
             </a:ln>
             <a:extLst>
               <a:ext uri="{91240B29-F687-4f45-9708-019B960494DF}">
-                <a14:hiddenLine xmlns:a14="http://schemas.microsoft.com/office/drawing/2010/main" xmlns="" w="9525">
+                <a14:hiddenLine xmlns="" xmlns:a14="http://schemas.microsoft.com/office/drawing/2010/main" w="9525">
                   <a:solidFill>
                     <a:srgbClr val="000000"/>
                   </a:solidFill>
@@ -1993,7 +1999,7 @@
             </a:ln>
             <a:extLst>
               <a:ext uri="{91240B29-F687-4f45-9708-019B960494DF}">
-                <a14:hiddenLine xmlns:a14="http://schemas.microsoft.com/office/drawing/2010/main" xmlns="" w="9525">
+                <a14:hiddenLine xmlns="" xmlns:a14="http://schemas.microsoft.com/office/drawing/2010/main" w="9525">
                   <a:solidFill>
                     <a:srgbClr val="000000"/>
                   </a:solidFill>
@@ -2061,7 +2067,7 @@
             </a:ln>
             <a:extLst>
               <a:ext uri="{91240B29-F687-4f45-9708-019B960494DF}">
-                <a14:hiddenLine xmlns:a14="http://schemas.microsoft.com/office/drawing/2010/main" xmlns="" w="9525">
+                <a14:hiddenLine xmlns="" xmlns:a14="http://schemas.microsoft.com/office/drawing/2010/main" w="9525">
                   <a:solidFill>
                     <a:srgbClr val="000000"/>
                   </a:solidFill>
@@ -2151,7 +2157,7 @@
             </a:ln>
             <a:extLst>
               <a:ext uri="{91240B29-F687-4f45-9708-019B960494DF}">
-                <a14:hiddenLine xmlns:a14="http://schemas.microsoft.com/office/drawing/2010/main" xmlns="" w="9525">
+                <a14:hiddenLine xmlns="" xmlns:a14="http://schemas.microsoft.com/office/drawing/2010/main" w="9525">
                   <a:solidFill>
                     <a:srgbClr val="000000"/>
                   </a:solidFill>
@@ -2219,7 +2225,7 @@
             </a:ln>
             <a:extLst>
               <a:ext uri="{91240B29-F687-4f45-9708-019B960494DF}">
-                <a14:hiddenLine xmlns:a14="http://schemas.microsoft.com/office/drawing/2010/main" xmlns="" w="9525">
+                <a14:hiddenLine xmlns="" xmlns:a14="http://schemas.microsoft.com/office/drawing/2010/main" w="9525">
                   <a:solidFill>
                     <a:srgbClr val="000000"/>
                   </a:solidFill>
@@ -2309,7 +2315,7 @@
             </a:ln>
             <a:extLst>
               <a:ext uri="{91240B29-F687-4f45-9708-019B960494DF}">
-                <a14:hiddenLine xmlns:a14="http://schemas.microsoft.com/office/drawing/2010/main" xmlns="" w="9525">
+                <a14:hiddenLine xmlns="" xmlns:a14="http://schemas.microsoft.com/office/drawing/2010/main" w="9525">
                   <a:solidFill>
                     <a:srgbClr val="000000"/>
                   </a:solidFill>
@@ -2343,7 +2349,7 @@
             </a:ln>
             <a:extLst>
               <a:ext uri="{91240B29-F687-4f45-9708-019B960494DF}">
-                <a14:hiddenLine xmlns:a14="http://schemas.microsoft.com/office/drawing/2010/main" xmlns="" w="9525">
+                <a14:hiddenLine xmlns="" xmlns:a14="http://schemas.microsoft.com/office/drawing/2010/main" w="9525">
                   <a:solidFill>
                     <a:srgbClr val="000000"/>
                   </a:solidFill>
@@ -2433,7 +2439,7 @@
             </a:ln>
             <a:extLst>
               <a:ext uri="{91240B29-F687-4f45-9708-019B960494DF}">
-                <a14:hiddenLine xmlns:a14="http://schemas.microsoft.com/office/drawing/2010/main" xmlns="" w="9525">
+                <a14:hiddenLine xmlns="" xmlns:a14="http://schemas.microsoft.com/office/drawing/2010/main" w="9525">
                   <a:solidFill>
                     <a:srgbClr val="000000"/>
                   </a:solidFill>
@@ -2495,7 +2501,7 @@
             </a:ln>
             <a:extLst>
               <a:ext uri="{91240B29-F687-4f45-9708-019B960494DF}">
-                <a14:hiddenLine xmlns:a14="http://schemas.microsoft.com/office/drawing/2010/main" xmlns="" w="9525">
+                <a14:hiddenLine xmlns="" xmlns:a14="http://schemas.microsoft.com/office/drawing/2010/main" w="9525">
                   <a:solidFill>
                     <a:srgbClr val="000000"/>
                   </a:solidFill>
@@ -2557,7 +2563,7 @@
             </a:ln>
             <a:extLst>
               <a:ext uri="{91240B29-F687-4f45-9708-019B960494DF}">
-                <a14:hiddenLine xmlns:a14="http://schemas.microsoft.com/office/drawing/2010/main" xmlns="" w="9525">
+                <a14:hiddenLine xmlns="" xmlns:a14="http://schemas.microsoft.com/office/drawing/2010/main" w="9525">
                   <a:solidFill>
                     <a:srgbClr val="000000"/>
                   </a:solidFill>
@@ -2647,7 +2653,7 @@
             </a:ln>
             <a:extLst>
               <a:ext uri="{91240B29-F687-4f45-9708-019B960494DF}">
-                <a14:hiddenLine xmlns:a14="http://schemas.microsoft.com/office/drawing/2010/main" xmlns="" w="9525">
+                <a14:hiddenLine xmlns="" xmlns:a14="http://schemas.microsoft.com/office/drawing/2010/main" w="9525">
                   <a:solidFill>
                     <a:srgbClr val="000000"/>
                   </a:solidFill>
@@ -2715,7 +2721,7 @@
             </a:ln>
             <a:extLst>
               <a:ext uri="{91240B29-F687-4f45-9708-019B960494DF}">
-                <a14:hiddenLine xmlns:a14="http://schemas.microsoft.com/office/drawing/2010/main" xmlns="" w="9525">
+                <a14:hiddenLine xmlns="" xmlns:a14="http://schemas.microsoft.com/office/drawing/2010/main" w="9525">
                   <a:solidFill>
                     <a:srgbClr val="000000"/>
                   </a:solidFill>
@@ -2777,7 +2783,7 @@
             </a:ln>
             <a:extLst>
               <a:ext uri="{91240B29-F687-4f45-9708-019B960494DF}">
-                <a14:hiddenLine xmlns:a14="http://schemas.microsoft.com/office/drawing/2010/main" xmlns="" w="9525">
+                <a14:hiddenLine xmlns="" xmlns:a14="http://schemas.microsoft.com/office/drawing/2010/main" w="9525">
                   <a:solidFill>
                     <a:srgbClr val="000000"/>
                   </a:solidFill>
@@ -2867,7 +2873,7 @@
             </a:ln>
             <a:extLst>
               <a:ext uri="{91240B29-F687-4f45-9708-019B960494DF}">
-                <a14:hiddenLine xmlns:a14="http://schemas.microsoft.com/office/drawing/2010/main" xmlns="" w="9525">
+                <a14:hiddenLine xmlns="" xmlns:a14="http://schemas.microsoft.com/office/drawing/2010/main" w="9525">
                   <a:solidFill>
                     <a:srgbClr val="000000"/>
                   </a:solidFill>
@@ -2929,7 +2935,7 @@
             </a:ln>
             <a:extLst>
               <a:ext uri="{91240B29-F687-4f45-9708-019B960494DF}">
-                <a14:hiddenLine xmlns:a14="http://schemas.microsoft.com/office/drawing/2010/main" xmlns="" w="9525">
+                <a14:hiddenLine xmlns="" xmlns:a14="http://schemas.microsoft.com/office/drawing/2010/main" w="9525">
                   <a:solidFill>
                     <a:srgbClr val="000000"/>
                   </a:solidFill>
@@ -3019,7 +3025,7 @@
             </a:ln>
             <a:extLst>
               <a:ext uri="{91240B29-F687-4f45-9708-019B960494DF}">
-                <a14:hiddenLine xmlns:a14="http://schemas.microsoft.com/office/drawing/2010/main" xmlns="" w="9525">
+                <a14:hiddenLine xmlns="" xmlns:a14="http://schemas.microsoft.com/office/drawing/2010/main" w="9525">
                   <a:solidFill>
                     <a:srgbClr val="000000"/>
                   </a:solidFill>
@@ -3081,7 +3087,7 @@
             </a:ln>
             <a:extLst>
               <a:ext uri="{91240B29-F687-4f45-9708-019B960494DF}">
-                <a14:hiddenLine xmlns:a14="http://schemas.microsoft.com/office/drawing/2010/main" xmlns="" w="9525">
+                <a14:hiddenLine xmlns="" xmlns:a14="http://schemas.microsoft.com/office/drawing/2010/main" w="9525">
                   <a:solidFill>
                     <a:srgbClr val="000000"/>
                   </a:solidFill>
@@ -3171,7 +3177,7 @@
             </a:ln>
             <a:extLst>
               <a:ext uri="{91240B29-F687-4f45-9708-019B960494DF}">
-                <a14:hiddenLine xmlns:a14="http://schemas.microsoft.com/office/drawing/2010/main" xmlns="" w="9525">
+                <a14:hiddenLine xmlns="" xmlns:a14="http://schemas.microsoft.com/office/drawing/2010/main" w="9525">
                   <a:solidFill>
                     <a:srgbClr val="000000"/>
                   </a:solidFill>
@@ -3205,7 +3211,7 @@
             </a:ln>
             <a:extLst>
               <a:ext uri="{91240B29-F687-4f45-9708-019B960494DF}">
-                <a14:hiddenLine xmlns:a14="http://schemas.microsoft.com/office/drawing/2010/main" xmlns="" w="9525">
+                <a14:hiddenLine xmlns="" xmlns:a14="http://schemas.microsoft.com/office/drawing/2010/main" w="9525">
                   <a:solidFill>
                     <a:srgbClr val="000000"/>
                   </a:solidFill>
@@ -3270,7 +3276,7 @@
             </a:ln>
             <a:extLst>
               <a:ext uri="{91240B29-F687-4f45-9708-019B960494DF}">
-                <a14:hiddenLine xmlns:a14="http://schemas.microsoft.com/office/drawing/2010/main" xmlns="" w="9525">
+                <a14:hiddenLine xmlns="" xmlns:a14="http://schemas.microsoft.com/office/drawing/2010/main" w="9525">
                   <a:solidFill>
                     <a:srgbClr val="000000"/>
                   </a:solidFill>
@@ -3360,7 +3366,7 @@
             </a:ln>
             <a:extLst>
               <a:ext uri="{91240B29-F687-4f45-9708-019B960494DF}">
-                <a14:hiddenLine xmlns:a14="http://schemas.microsoft.com/office/drawing/2010/main" xmlns="" w="9525">
+                <a14:hiddenLine xmlns="" xmlns:a14="http://schemas.microsoft.com/office/drawing/2010/main" w="9525">
                   <a:solidFill>
                     <a:srgbClr val="000000"/>
                   </a:solidFill>
@@ -3422,7 +3428,7 @@
             </a:ln>
             <a:extLst>
               <a:ext uri="{91240B29-F687-4f45-9708-019B960494DF}">
-                <a14:hiddenLine xmlns:a14="http://schemas.microsoft.com/office/drawing/2010/main" xmlns="" w="9525">
+                <a14:hiddenLine xmlns="" xmlns:a14="http://schemas.microsoft.com/office/drawing/2010/main" w="9525">
                   <a:solidFill>
                     <a:srgbClr val="000000"/>
                   </a:solidFill>
@@ -3512,7 +3518,7 @@
             </a:ln>
             <a:extLst>
               <a:ext uri="{91240B29-F687-4f45-9708-019B960494DF}">
-                <a14:hiddenLine xmlns:a14="http://schemas.microsoft.com/office/drawing/2010/main" xmlns="" w="9525">
+                <a14:hiddenLine xmlns="" xmlns:a14="http://schemas.microsoft.com/office/drawing/2010/main" w="9525">
                   <a:solidFill>
                     <a:srgbClr val="000000"/>
                   </a:solidFill>
@@ -3602,7 +3608,7 @@
             </a:ln>
             <a:extLst>
               <a:ext uri="{91240B29-F687-4f45-9708-019B960494DF}">
-                <a14:hiddenLine xmlns:a14="http://schemas.microsoft.com/office/drawing/2010/main" xmlns="" w="9525">
+                <a14:hiddenLine xmlns="" xmlns:a14="http://schemas.microsoft.com/office/drawing/2010/main" w="9525">
                   <a:solidFill>
                     <a:srgbClr val="000000"/>
                   </a:solidFill>
@@ -3667,7 +3673,7 @@
             </a:ln>
             <a:extLst>
               <a:ext uri="{91240B29-F687-4f45-9708-019B960494DF}">
-                <a14:hiddenLine xmlns:a14="http://schemas.microsoft.com/office/drawing/2010/main" xmlns="" w="9525">
+                <a14:hiddenLine xmlns="" xmlns:a14="http://schemas.microsoft.com/office/drawing/2010/main" w="9525">
                   <a:solidFill>
                     <a:srgbClr val="000000"/>
                   </a:solidFill>
@@ -3729,7 +3735,7 @@
             </a:ln>
             <a:extLst>
               <a:ext uri="{91240B29-F687-4f45-9708-019B960494DF}">
-                <a14:hiddenLine xmlns:a14="http://schemas.microsoft.com/office/drawing/2010/main" xmlns="" w="9525">
+                <a14:hiddenLine xmlns="" xmlns:a14="http://schemas.microsoft.com/office/drawing/2010/main" w="9525">
                   <a:solidFill>
                     <a:srgbClr val="000000"/>
                   </a:solidFill>
@@ -3819,7 +3825,7 @@
             </a:ln>
             <a:extLst>
               <a:ext uri="{91240B29-F687-4f45-9708-019B960494DF}">
-                <a14:hiddenLine xmlns:a14="http://schemas.microsoft.com/office/drawing/2010/main" xmlns="" w="9525">
+                <a14:hiddenLine xmlns="" xmlns:a14="http://schemas.microsoft.com/office/drawing/2010/main" w="9525">
                   <a:solidFill>
                     <a:srgbClr val="000000"/>
                   </a:solidFill>
@@ -3909,7 +3915,7 @@
             </a:ln>
             <a:extLst>
               <a:ext uri="{91240B29-F687-4f45-9708-019B960494DF}">
-                <a14:hiddenLine xmlns:a14="http://schemas.microsoft.com/office/drawing/2010/main" xmlns="" w="9525">
+                <a14:hiddenLine xmlns="" xmlns:a14="http://schemas.microsoft.com/office/drawing/2010/main" w="9525">
                   <a:solidFill>
                     <a:srgbClr val="000000"/>
                   </a:solidFill>
@@ -3971,7 +3977,7 @@
             </a:ln>
             <a:extLst>
               <a:ext uri="{91240B29-F687-4f45-9708-019B960494DF}">
-                <a14:hiddenLine xmlns:a14="http://schemas.microsoft.com/office/drawing/2010/main" xmlns="" w="9525">
+                <a14:hiddenLine xmlns="" xmlns:a14="http://schemas.microsoft.com/office/drawing/2010/main" w="9525">
                   <a:solidFill>
                     <a:srgbClr val="000000"/>
                   </a:solidFill>
@@ -4091,7 +4097,7 @@
             </a:ln>
             <a:extLst>
               <a:ext uri="{91240B29-F687-4f45-9708-019B960494DF}">
-                <a14:hiddenLine xmlns:a14="http://schemas.microsoft.com/office/drawing/2010/main" xmlns="" w="9525">
+                <a14:hiddenLine xmlns="" xmlns:a14="http://schemas.microsoft.com/office/drawing/2010/main" w="9525">
                   <a:solidFill>
                     <a:srgbClr val="000000"/>
                   </a:solidFill>
@@ -4159,7 +4165,7 @@
             </a:ln>
             <a:extLst>
               <a:ext uri="{91240B29-F687-4f45-9708-019B960494DF}">
-                <a14:hiddenLine xmlns:a14="http://schemas.microsoft.com/office/drawing/2010/main" xmlns="" w="9525">
+                <a14:hiddenLine xmlns="" xmlns:a14="http://schemas.microsoft.com/office/drawing/2010/main" w="9525">
                   <a:solidFill>
                     <a:srgbClr val="000000"/>
                   </a:solidFill>
@@ -4249,7 +4255,7 @@
             </a:ln>
             <a:extLst>
               <a:ext uri="{91240B29-F687-4f45-9708-019B960494DF}">
-                <a14:hiddenLine xmlns:a14="http://schemas.microsoft.com/office/drawing/2010/main" xmlns="" w="9525">
+                <a14:hiddenLine xmlns="" xmlns:a14="http://schemas.microsoft.com/office/drawing/2010/main" w="9525">
                   <a:solidFill>
                     <a:srgbClr val="000000"/>
                   </a:solidFill>
@@ -4389,7 +4395,7 @@
           <a:p>
             <a:fld id="{48A87A34-81AB-432B-8DAE-1953F412C126}" type="datetimeFigureOut">
               <a:rPr lang="en-US" dirty="0"/>
-              <a:t>1/3/2025</a:t>
+              <a:t>1/7/2025</a:t>
             </a:fld>
             <a:endParaRPr lang="en-US" dirty="0"/>
           </a:p>
@@ -4651,7 +4657,7 @@
           <a:p>
             <a:fld id="{48A87A34-81AB-432B-8DAE-1953F412C126}" type="datetimeFigureOut">
               <a:rPr lang="en-US" dirty="0"/>
-              <a:t>1/3/2025</a:t>
+              <a:t>1/7/2025</a:t>
             </a:fld>
             <a:endParaRPr lang="en-US" dirty="0"/>
           </a:p>
@@ -4842,7 +4848,7 @@
           <a:p>
             <a:fld id="{48A87A34-81AB-432B-8DAE-1953F412C126}" type="datetimeFigureOut">
               <a:rPr lang="en-US" dirty="0"/>
-              <a:t>1/3/2025</a:t>
+              <a:t>1/7/2025</a:t>
             </a:fld>
             <a:endParaRPr lang="en-US" dirty="0"/>
           </a:p>
@@ -5100,7 +5106,7 @@
           <a:p>
             <a:fld id="{48A87A34-81AB-432B-8DAE-1953F412C126}" type="datetimeFigureOut">
               <a:rPr lang="en-US" dirty="0"/>
-              <a:t>1/3/2025</a:t>
+              <a:t>1/7/2025</a:t>
             </a:fld>
             <a:endParaRPr lang="en-US" dirty="0"/>
           </a:p>
@@ -5529,7 +5535,7 @@
           <a:p>
             <a:fld id="{48A87A34-81AB-432B-8DAE-1953F412C126}" type="datetimeFigureOut">
               <a:rPr lang="en-US" dirty="0"/>
-              <a:t>1/3/2025</a:t>
+              <a:t>1/7/2025</a:t>
             </a:fld>
             <a:endParaRPr lang="en-US" dirty="0"/>
           </a:p>
@@ -6070,7 +6076,7 @@
           <a:p>
             <a:fld id="{48A87A34-81AB-432B-8DAE-1953F412C126}" type="datetimeFigureOut">
               <a:rPr lang="en-US" dirty="0"/>
-              <a:t>1/3/2025</a:t>
+              <a:t>1/7/2025</a:t>
             </a:fld>
             <a:endParaRPr lang="en-US" dirty="0"/>
           </a:p>
@@ -6785,7 +6791,7 @@
           <a:p>
             <a:fld id="{48A87A34-81AB-432B-8DAE-1953F412C126}" type="datetimeFigureOut">
               <a:rPr lang="en-US" dirty="0"/>
-              <a:t>1/3/2025</a:t>
+              <a:t>1/7/2025</a:t>
             </a:fld>
             <a:endParaRPr lang="en-US" dirty="0"/>
           </a:p>
@@ -6950,7 +6956,7 @@
           <a:p>
             <a:fld id="{48A87A34-81AB-432B-8DAE-1953F412C126}" type="datetimeFigureOut">
               <a:rPr lang="en-US" dirty="0"/>
-              <a:t>1/3/2025</a:t>
+              <a:t>1/7/2025</a:t>
             </a:fld>
             <a:endParaRPr lang="en-US" dirty="0"/>
           </a:p>
@@ -7125,7 +7131,7 @@
           <a:p>
             <a:fld id="{48A87A34-81AB-432B-8DAE-1953F412C126}" type="datetimeFigureOut">
               <a:rPr lang="en-US" dirty="0"/>
-              <a:t>1/3/2025</a:t>
+              <a:t>1/7/2025</a:t>
             </a:fld>
             <a:endParaRPr lang="en-US" dirty="0"/>
           </a:p>
@@ -7290,7 +7296,7 @@
           <a:p>
             <a:fld id="{48A87A34-81AB-432B-8DAE-1953F412C126}" type="datetimeFigureOut">
               <a:rPr lang="en-US" dirty="0"/>
-              <a:t>1/3/2025</a:t>
+              <a:t>1/7/2025</a:t>
             </a:fld>
             <a:endParaRPr lang="en-US" dirty="0"/>
           </a:p>
@@ -7535,7 +7541,7 @@
           <a:p>
             <a:fld id="{48A87A34-81AB-432B-8DAE-1953F412C126}" type="datetimeFigureOut">
               <a:rPr lang="en-US" dirty="0"/>
-              <a:t>1/3/2025</a:t>
+              <a:t>1/7/2025</a:t>
             </a:fld>
             <a:endParaRPr lang="en-US" dirty="0"/>
           </a:p>
@@ -7762,7 +7768,7 @@
           <a:p>
             <a:fld id="{48A87A34-81AB-432B-8DAE-1953F412C126}" type="datetimeFigureOut">
               <a:rPr lang="en-US" dirty="0"/>
-              <a:t>1/3/2025</a:t>
+              <a:t>1/7/2025</a:t>
             </a:fld>
             <a:endParaRPr lang="en-US" dirty="0"/>
           </a:p>
@@ -8138,7 +8144,7 @@
           <a:p>
             <a:fld id="{48A87A34-81AB-432B-8DAE-1953F412C126}" type="datetimeFigureOut">
               <a:rPr lang="en-US" dirty="0"/>
-              <a:t>1/3/2025</a:t>
+              <a:t>1/7/2025</a:t>
             </a:fld>
             <a:endParaRPr lang="en-US" dirty="0"/>
           </a:p>
@@ -8251,7 +8257,7 @@
           <a:p>
             <a:fld id="{48A87A34-81AB-432B-8DAE-1953F412C126}" type="datetimeFigureOut">
               <a:rPr lang="en-US" dirty="0"/>
-              <a:t>1/3/2025</a:t>
+              <a:t>1/7/2025</a:t>
             </a:fld>
             <a:endParaRPr lang="en-US" dirty="0"/>
           </a:p>
@@ -8341,7 +8347,7 @@
           <a:p>
             <a:fld id="{48A87A34-81AB-432B-8DAE-1953F412C126}" type="datetimeFigureOut">
               <a:rPr lang="en-US" dirty="0"/>
-              <a:t>1/3/2025</a:t>
+              <a:t>1/7/2025</a:t>
             </a:fld>
             <a:endParaRPr lang="en-US" dirty="0"/>
           </a:p>
@@ -8585,7 +8591,7 @@
           <a:p>
             <a:fld id="{48A87A34-81AB-432B-8DAE-1953F412C126}" type="datetimeFigureOut">
               <a:rPr lang="en-US" dirty="0"/>
-              <a:t>1/3/2025</a:t>
+              <a:t>1/7/2025</a:t>
             </a:fld>
             <a:endParaRPr lang="en-US" dirty="0"/>
           </a:p>
@@ -8860,7 +8866,7 @@
           <a:p>
             <a:fld id="{48A87A34-81AB-432B-8DAE-1953F412C126}" type="datetimeFigureOut">
               <a:rPr lang="en-US" dirty="0"/>
-              <a:t>1/3/2025</a:t>
+              <a:t>1/7/2025</a:t>
             </a:fld>
             <a:endParaRPr lang="en-US" dirty="0"/>
           </a:p>
@@ -8971,7 +8977,7 @@
           <a:noFill/>
           <a:extLst>
             <a:ext uri="{909E8E84-426E-40dd-AFC4-6F175D3DCCD1}">
-              <a14:hiddenFill xmlns:a14="http://schemas.microsoft.com/office/drawing/2010/main" xmlns="">
+              <a14:hiddenFill xmlns="" xmlns:a14="http://schemas.microsoft.com/office/drawing/2010/main">
                 <a:solidFill>
                   <a:srgbClr val="FFFFFF"/>
                 </a:solidFill>
@@ -9045,7 +9051,7 @@
               </a:ln>
               <a:extLst>
                 <a:ext uri="{91240B29-F687-4f45-9708-019B960494DF}">
-                  <a14:hiddenLine xmlns:a14="http://schemas.microsoft.com/office/drawing/2010/main" xmlns="" w="9525">
+                  <a14:hiddenLine xmlns="" xmlns:a14="http://schemas.microsoft.com/office/drawing/2010/main" w="9525">
                     <a:solidFill>
                       <a:srgbClr val="000000"/>
                     </a:solidFill>
@@ -9135,7 +9141,7 @@
               </a:ln>
               <a:extLst>
                 <a:ext uri="{91240B29-F687-4f45-9708-019B960494DF}">
-                  <a14:hiddenLine xmlns:a14="http://schemas.microsoft.com/office/drawing/2010/main" xmlns="" w="9525">
+                  <a14:hiddenLine xmlns="" xmlns:a14="http://schemas.microsoft.com/office/drawing/2010/main" w="9525">
                     <a:solidFill>
                       <a:srgbClr val="000000"/>
                     </a:solidFill>
@@ -9225,7 +9231,7 @@
               </a:ln>
               <a:extLst>
                 <a:ext uri="{91240B29-F687-4f45-9708-019B960494DF}">
-                  <a14:hiddenLine xmlns:a14="http://schemas.microsoft.com/office/drawing/2010/main" xmlns="" w="9525">
+                  <a14:hiddenLine xmlns="" xmlns:a14="http://schemas.microsoft.com/office/drawing/2010/main" w="9525">
                     <a:solidFill>
                       <a:srgbClr val="000000"/>
                     </a:solidFill>
@@ -9287,7 +9293,7 @@
               </a:ln>
               <a:extLst>
                 <a:ext uri="{91240B29-F687-4f45-9708-019B960494DF}">
-                  <a14:hiddenLine xmlns:a14="http://schemas.microsoft.com/office/drawing/2010/main" xmlns="" w="9525">
+                  <a14:hiddenLine xmlns="" xmlns:a14="http://schemas.microsoft.com/office/drawing/2010/main" w="9525">
                     <a:solidFill>
                       <a:srgbClr val="000000"/>
                     </a:solidFill>
@@ -9377,7 +9383,7 @@
               </a:ln>
               <a:extLst>
                 <a:ext uri="{91240B29-F687-4f45-9708-019B960494DF}">
-                  <a14:hiddenLine xmlns:a14="http://schemas.microsoft.com/office/drawing/2010/main" xmlns="" w="9525">
+                  <a14:hiddenLine xmlns="" xmlns:a14="http://schemas.microsoft.com/office/drawing/2010/main" w="9525">
                     <a:solidFill>
                       <a:srgbClr val="000000"/>
                     </a:solidFill>
@@ -9439,7 +9445,7 @@
               </a:ln>
               <a:extLst>
                 <a:ext uri="{91240B29-F687-4f45-9708-019B960494DF}">
-                  <a14:hiddenLine xmlns:a14="http://schemas.microsoft.com/office/drawing/2010/main" xmlns="" w="9525">
+                  <a14:hiddenLine xmlns="" xmlns:a14="http://schemas.microsoft.com/office/drawing/2010/main" w="9525">
                     <a:solidFill>
                       <a:srgbClr val="000000"/>
                     </a:solidFill>
@@ -9501,7 +9507,7 @@
               </a:ln>
               <a:extLst>
                 <a:ext uri="{91240B29-F687-4f45-9708-019B960494DF}">
-                  <a14:hiddenLine xmlns:a14="http://schemas.microsoft.com/office/drawing/2010/main" xmlns="" w="9525">
+                  <a14:hiddenLine xmlns="" xmlns:a14="http://schemas.microsoft.com/office/drawing/2010/main" w="9525">
                     <a:solidFill>
                       <a:srgbClr val="000000"/>
                     </a:solidFill>
@@ -9591,7 +9597,7 @@
               </a:ln>
               <a:extLst>
                 <a:ext uri="{91240B29-F687-4f45-9708-019B960494DF}">
-                  <a14:hiddenLine xmlns:a14="http://schemas.microsoft.com/office/drawing/2010/main" xmlns="" w="9525">
+                  <a14:hiddenLine xmlns="" xmlns:a14="http://schemas.microsoft.com/office/drawing/2010/main" w="9525">
                     <a:solidFill>
                       <a:srgbClr val="000000"/>
                     </a:solidFill>
@@ -9681,7 +9687,7 @@
               </a:ln>
               <a:extLst>
                 <a:ext uri="{91240B29-F687-4f45-9708-019B960494DF}">
-                  <a14:hiddenLine xmlns:a14="http://schemas.microsoft.com/office/drawing/2010/main" xmlns="" w="9525">
+                  <a14:hiddenLine xmlns="" xmlns:a14="http://schemas.microsoft.com/office/drawing/2010/main" w="9525">
                     <a:solidFill>
                       <a:srgbClr val="000000"/>
                     </a:solidFill>
@@ -9743,7 +9749,7 @@
               </a:ln>
               <a:extLst>
                 <a:ext uri="{91240B29-F687-4f45-9708-019B960494DF}">
-                  <a14:hiddenLine xmlns:a14="http://schemas.microsoft.com/office/drawing/2010/main" xmlns="" w="9525">
+                  <a14:hiddenLine xmlns="" xmlns:a14="http://schemas.microsoft.com/office/drawing/2010/main" w="9525">
                     <a:solidFill>
                       <a:srgbClr val="000000"/>
                     </a:solidFill>
@@ -9853,7 +9859,7 @@
               </a:ln>
               <a:extLst>
                 <a:ext uri="{91240B29-F687-4f45-9708-019B960494DF}">
-                  <a14:hiddenLine xmlns:a14="http://schemas.microsoft.com/office/drawing/2010/main" xmlns="" w="9525">
+                  <a14:hiddenLine xmlns="" xmlns:a14="http://schemas.microsoft.com/office/drawing/2010/main" w="9525">
                     <a:solidFill>
                       <a:srgbClr val="000000"/>
                     </a:solidFill>
@@ -9937,7 +9943,7 @@
               </a:ln>
               <a:extLst>
                 <a:ext uri="{91240B29-F687-4f45-9708-019B960494DF}">
-                  <a14:hiddenLine xmlns:a14="http://schemas.microsoft.com/office/drawing/2010/main" xmlns="" w="9525">
+                  <a14:hiddenLine xmlns="" xmlns:a14="http://schemas.microsoft.com/office/drawing/2010/main" w="9525">
                     <a:solidFill>
                       <a:srgbClr val="000000"/>
                     </a:solidFill>
@@ -9999,7 +10005,7 @@
               </a:ln>
               <a:extLst>
                 <a:ext uri="{91240B29-F687-4f45-9708-019B960494DF}">
-                  <a14:hiddenLine xmlns:a14="http://schemas.microsoft.com/office/drawing/2010/main" xmlns="" w="9525">
+                  <a14:hiddenLine xmlns="" xmlns:a14="http://schemas.microsoft.com/office/drawing/2010/main" w="9525">
                     <a:solidFill>
                       <a:srgbClr val="000000"/>
                     </a:solidFill>
@@ -10061,7 +10067,7 @@
               </a:ln>
               <a:extLst>
                 <a:ext uri="{91240B29-F687-4f45-9708-019B960494DF}">
-                  <a14:hiddenLine xmlns:a14="http://schemas.microsoft.com/office/drawing/2010/main" xmlns="" w="9525">
+                  <a14:hiddenLine xmlns="" xmlns:a14="http://schemas.microsoft.com/office/drawing/2010/main" w="9525">
                     <a:solidFill>
                       <a:srgbClr val="000000"/>
                     </a:solidFill>
@@ -10151,7 +10157,7 @@
               </a:ln>
               <a:extLst>
                 <a:ext uri="{91240B29-F687-4f45-9708-019B960494DF}">
-                  <a14:hiddenLine xmlns:a14="http://schemas.microsoft.com/office/drawing/2010/main" xmlns="" w="9525">
+                  <a14:hiddenLine xmlns="" xmlns:a14="http://schemas.microsoft.com/office/drawing/2010/main" w="9525">
                     <a:solidFill>
                       <a:srgbClr val="000000"/>
                     </a:solidFill>
@@ -10185,7 +10191,7 @@
               </a:ln>
               <a:extLst>
                 <a:ext uri="{91240B29-F687-4f45-9708-019B960494DF}">
-                  <a14:hiddenLine xmlns:a14="http://schemas.microsoft.com/office/drawing/2010/main" xmlns="" w="9525">
+                  <a14:hiddenLine xmlns="" xmlns:a14="http://schemas.microsoft.com/office/drawing/2010/main" w="9525">
                     <a:solidFill>
                       <a:srgbClr val="000000"/>
                     </a:solidFill>
@@ -10250,7 +10256,7 @@
               </a:ln>
               <a:extLst>
                 <a:ext uri="{91240B29-F687-4f45-9708-019B960494DF}">
-                  <a14:hiddenLine xmlns:a14="http://schemas.microsoft.com/office/drawing/2010/main" xmlns="" w="9525">
+                  <a14:hiddenLine xmlns="" xmlns:a14="http://schemas.microsoft.com/office/drawing/2010/main" w="9525">
                     <a:solidFill>
                       <a:srgbClr val="000000"/>
                     </a:solidFill>
@@ -10340,7 +10346,7 @@
               </a:ln>
               <a:extLst>
                 <a:ext uri="{91240B29-F687-4f45-9708-019B960494DF}">
-                  <a14:hiddenLine xmlns:a14="http://schemas.microsoft.com/office/drawing/2010/main" xmlns="" w="9525">
+                  <a14:hiddenLine xmlns="" xmlns:a14="http://schemas.microsoft.com/office/drawing/2010/main" w="9525">
                     <a:solidFill>
                       <a:srgbClr val="000000"/>
                     </a:solidFill>
@@ -10402,7 +10408,7 @@
               </a:ln>
               <a:extLst>
                 <a:ext uri="{91240B29-F687-4f45-9708-019B960494DF}">
-                  <a14:hiddenLine xmlns:a14="http://schemas.microsoft.com/office/drawing/2010/main" xmlns="" w="9525">
+                  <a14:hiddenLine xmlns="" xmlns:a14="http://schemas.microsoft.com/office/drawing/2010/main" w="9525">
                     <a:solidFill>
                       <a:srgbClr val="000000"/>
                     </a:solidFill>
@@ -10492,7 +10498,7 @@
               </a:ln>
               <a:extLst>
                 <a:ext uri="{91240B29-F687-4f45-9708-019B960494DF}">
-                  <a14:hiddenLine xmlns:a14="http://schemas.microsoft.com/office/drawing/2010/main" xmlns="" w="9525">
+                  <a14:hiddenLine xmlns="" xmlns:a14="http://schemas.microsoft.com/office/drawing/2010/main" w="9525">
                     <a:solidFill>
                       <a:srgbClr val="000000"/>
                     </a:solidFill>
@@ -10557,7 +10563,7 @@
               </a:ln>
               <a:extLst>
                 <a:ext uri="{91240B29-F687-4f45-9708-019B960494DF}">
-                  <a14:hiddenLine xmlns:a14="http://schemas.microsoft.com/office/drawing/2010/main" xmlns="" w="9525">
+                  <a14:hiddenLine xmlns="" xmlns:a14="http://schemas.microsoft.com/office/drawing/2010/main" w="9525">
                     <a:solidFill>
                       <a:srgbClr val="000000"/>
                     </a:solidFill>
@@ -10619,7 +10625,7 @@
               </a:ln>
               <a:extLst>
                 <a:ext uri="{91240B29-F687-4f45-9708-019B960494DF}">
-                  <a14:hiddenLine xmlns:a14="http://schemas.microsoft.com/office/drawing/2010/main" xmlns="" w="9525">
+                  <a14:hiddenLine xmlns="" xmlns:a14="http://schemas.microsoft.com/office/drawing/2010/main" w="9525">
                     <a:solidFill>
                       <a:srgbClr val="000000"/>
                     </a:solidFill>
@@ -10709,7 +10715,7 @@
               </a:ln>
               <a:extLst>
                 <a:ext uri="{91240B29-F687-4f45-9708-019B960494DF}">
-                  <a14:hiddenLine xmlns:a14="http://schemas.microsoft.com/office/drawing/2010/main" xmlns="" w="9525">
+                  <a14:hiddenLine xmlns="" xmlns:a14="http://schemas.microsoft.com/office/drawing/2010/main" w="9525">
                     <a:solidFill>
                       <a:srgbClr val="000000"/>
                     </a:solidFill>
@@ -10799,7 +10805,7 @@
               </a:ln>
               <a:extLst>
                 <a:ext uri="{91240B29-F687-4f45-9708-019B960494DF}">
-                  <a14:hiddenLine xmlns:a14="http://schemas.microsoft.com/office/drawing/2010/main" xmlns="" w="9525">
+                  <a14:hiddenLine xmlns="" xmlns:a14="http://schemas.microsoft.com/office/drawing/2010/main" w="9525">
                     <a:solidFill>
                       <a:srgbClr val="000000"/>
                     </a:solidFill>
@@ -10864,7 +10870,7 @@
               </a:ln>
               <a:extLst>
                 <a:ext uri="{91240B29-F687-4f45-9708-019B960494DF}">
-                  <a14:hiddenLine xmlns:a14="http://schemas.microsoft.com/office/drawing/2010/main" xmlns="" w="9525">
+                  <a14:hiddenLine xmlns="" xmlns:a14="http://schemas.microsoft.com/office/drawing/2010/main" w="9525">
                     <a:solidFill>
                       <a:srgbClr val="000000"/>
                     </a:solidFill>
@@ -10984,7 +10990,7 @@
               </a:ln>
               <a:extLst>
                 <a:ext uri="{91240B29-F687-4f45-9708-019B960494DF}">
-                  <a14:hiddenLine xmlns:a14="http://schemas.microsoft.com/office/drawing/2010/main" xmlns="" w="9525">
+                  <a14:hiddenLine xmlns="" xmlns:a14="http://schemas.microsoft.com/office/drawing/2010/main" w="9525">
                     <a:solidFill>
                       <a:srgbClr val="000000"/>
                     </a:solidFill>
@@ -11082,7 +11088,7 @@
               </a:ln>
               <a:extLst>
                 <a:ext uri="{91240B29-F687-4f45-9708-019B960494DF}">
-                  <a14:hiddenLine xmlns:a14="http://schemas.microsoft.com/office/drawing/2010/main" xmlns="" w="9525">
+                  <a14:hiddenLine xmlns="" xmlns:a14="http://schemas.microsoft.com/office/drawing/2010/main" w="9525">
                     <a:solidFill>
                       <a:srgbClr val="000000"/>
                     </a:solidFill>
@@ -11197,7 +11203,7 @@
               </a:ln>
               <a:extLst>
                 <a:ext uri="{91240B29-F687-4f45-9708-019B960494DF}">
-                  <a14:hiddenLine xmlns:a14="http://schemas.microsoft.com/office/drawing/2010/main" xmlns="" w="9525">
+                  <a14:hiddenLine xmlns="" xmlns:a14="http://schemas.microsoft.com/office/drawing/2010/main" w="9525">
                     <a:solidFill>
                       <a:srgbClr val="000000"/>
                     </a:solidFill>
@@ -11287,7 +11293,7 @@
               </a:ln>
               <a:extLst>
                 <a:ext uri="{91240B29-F687-4f45-9708-019B960494DF}">
-                  <a14:hiddenLine xmlns:a14="http://schemas.microsoft.com/office/drawing/2010/main" xmlns="" w="9525">
+                  <a14:hiddenLine xmlns="" xmlns:a14="http://schemas.microsoft.com/office/drawing/2010/main" w="9525">
                     <a:solidFill>
                       <a:srgbClr val="000000"/>
                     </a:solidFill>
@@ -11352,7 +11358,7 @@
               </a:ln>
               <a:extLst>
                 <a:ext uri="{91240B29-F687-4f45-9708-019B960494DF}">
-                  <a14:hiddenLine xmlns:a14="http://schemas.microsoft.com/office/drawing/2010/main" xmlns="" w="9525">
+                  <a14:hiddenLine xmlns="" xmlns:a14="http://schemas.microsoft.com/office/drawing/2010/main" w="9525">
                     <a:solidFill>
                       <a:srgbClr val="000000"/>
                     </a:solidFill>
@@ -11442,7 +11448,7 @@
               </a:ln>
               <a:extLst>
                 <a:ext uri="{91240B29-F687-4f45-9708-019B960494DF}">
-                  <a14:hiddenLine xmlns:a14="http://schemas.microsoft.com/office/drawing/2010/main" xmlns="" w="9525">
+                  <a14:hiddenLine xmlns="" xmlns:a14="http://schemas.microsoft.com/office/drawing/2010/main" w="9525">
                     <a:solidFill>
                       <a:srgbClr val="000000"/>
                     </a:solidFill>
@@ -11510,7 +11516,7 @@
               </a:ln>
               <a:extLst>
                 <a:ext uri="{91240B29-F687-4f45-9708-019B960494DF}">
-                  <a14:hiddenLine xmlns:a14="http://schemas.microsoft.com/office/drawing/2010/main" xmlns="" w="9525">
+                  <a14:hiddenLine xmlns="" xmlns:a14="http://schemas.microsoft.com/office/drawing/2010/main" w="9525">
                     <a:solidFill>
                       <a:srgbClr val="000000"/>
                     </a:solidFill>
@@ -11600,7 +11606,7 @@
               </a:ln>
               <a:extLst>
                 <a:ext uri="{91240B29-F687-4f45-9708-019B960494DF}">
-                  <a14:hiddenLine xmlns:a14="http://schemas.microsoft.com/office/drawing/2010/main" xmlns="" w="9525">
+                  <a14:hiddenLine xmlns="" xmlns:a14="http://schemas.microsoft.com/office/drawing/2010/main" w="9525">
                     <a:solidFill>
                       <a:srgbClr val="000000"/>
                     </a:solidFill>
@@ -11668,7 +11674,7 @@
               </a:ln>
               <a:extLst>
                 <a:ext uri="{91240B29-F687-4f45-9708-019B960494DF}">
-                  <a14:hiddenLine xmlns:a14="http://schemas.microsoft.com/office/drawing/2010/main" xmlns="" w="9525">
+                  <a14:hiddenLine xmlns="" xmlns:a14="http://schemas.microsoft.com/office/drawing/2010/main" w="9525">
                     <a:solidFill>
                       <a:srgbClr val="000000"/>
                     </a:solidFill>
@@ -11758,7 +11764,7 @@
               </a:ln>
               <a:extLst>
                 <a:ext uri="{91240B29-F687-4f45-9708-019B960494DF}">
-                  <a14:hiddenLine xmlns:a14="http://schemas.microsoft.com/office/drawing/2010/main" xmlns="" w="9525">
+                  <a14:hiddenLine xmlns="" xmlns:a14="http://schemas.microsoft.com/office/drawing/2010/main" w="9525">
                     <a:solidFill>
                       <a:srgbClr val="000000"/>
                     </a:solidFill>
@@ -11792,7 +11798,7 @@
               </a:ln>
               <a:extLst>
                 <a:ext uri="{91240B29-F687-4f45-9708-019B960494DF}">
-                  <a14:hiddenLine xmlns:a14="http://schemas.microsoft.com/office/drawing/2010/main" xmlns="" w="9525">
+                  <a14:hiddenLine xmlns="" xmlns:a14="http://schemas.microsoft.com/office/drawing/2010/main" w="9525">
                     <a:solidFill>
                       <a:srgbClr val="000000"/>
                     </a:solidFill>
@@ -11933,7 +11939,7 @@
             <a:fld id="{48A87A34-81AB-432B-8DAE-1953F412C126}" type="datetimeFigureOut">
               <a:rPr lang="en-US" dirty="0"/>
               <a:pPr/>
-              <a:t>1/3/2025</a:t>
+              <a:t>1/7/2025</a:t>
             </a:fld>
             <a:endParaRPr lang="en-US" dirty="0"/>
           </a:p>
@@ -12531,7 +12537,7 @@
           <a:p>
             <a:r>
               <a:rPr lang="de-DE" dirty="0"/>
-              <a:t>Feature Engineering</a:t>
+              <a:t>Variablen &amp; Feature Engineering</a:t>
             </a:r>
           </a:p>
         </p:txBody>
@@ -12557,6 +12563,162 @@
           <a:bodyPr/>
           <a:lstStyle/>
           <a:p>
+            <a:r>
+              <a:rPr lang="en-GB" dirty="0"/>
+              <a:t>'Datum', '</a:t>
+            </a:r>
+            <a:r>
+              <a:rPr lang="en-GB" dirty="0" err="1"/>
+              <a:t>Bewoelkung</a:t>
+            </a:r>
+            <a:r>
+              <a:rPr lang="en-GB" dirty="0"/>
+              <a:t>', '</a:t>
+            </a:r>
+            <a:r>
+              <a:rPr lang="en-GB" dirty="0" err="1"/>
+              <a:t>Temperatur</a:t>
+            </a:r>
+            <a:r>
+              <a:rPr lang="en-GB" dirty="0"/>
+              <a:t>', '</a:t>
+            </a:r>
+            <a:r>
+              <a:rPr lang="en-GB" dirty="0" err="1"/>
+              <a:t>Windgeschwindigkeit</a:t>
+            </a:r>
+            <a:r>
+              <a:rPr lang="en-GB" dirty="0"/>
+              <a:t>', '</a:t>
+            </a:r>
+            <a:r>
+              <a:rPr lang="en-GB" dirty="0" err="1"/>
+              <a:t>Wettercode</a:t>
+            </a:r>
+            <a:r>
+              <a:rPr lang="en-GB" dirty="0"/>
+              <a:t>', 'id', '</a:t>
+            </a:r>
+            <a:r>
+              <a:rPr lang="en-GB" dirty="0" err="1"/>
+              <a:t>Warengruppe</a:t>
+            </a:r>
+            <a:r>
+              <a:rPr lang="en-GB" dirty="0"/>
+              <a:t>', '</a:t>
+            </a:r>
+            <a:r>
+              <a:rPr lang="en-GB" dirty="0" err="1"/>
+              <a:t>Umsatz</a:t>
+            </a:r>
+            <a:r>
+              <a:rPr lang="en-GB" dirty="0"/>
+              <a:t>', '</a:t>
+            </a:r>
+            <a:r>
+              <a:rPr lang="en-GB" dirty="0" err="1"/>
+              <a:t>KiWo</a:t>
+            </a:r>
+            <a:r>
+              <a:rPr lang="en-GB" dirty="0"/>
+              <a:t>', '</a:t>
+            </a:r>
+            <a:r>
+              <a:rPr lang="en-GB" dirty="0" err="1"/>
+              <a:t>Ferien</a:t>
+            </a:r>
+            <a:r>
+              <a:rPr lang="en-GB" dirty="0"/>
+              <a:t>', '</a:t>
+            </a:r>
+            <a:r>
+              <a:rPr lang="en-GB" dirty="0" err="1"/>
+              <a:t>Is_Ferien</a:t>
+            </a:r>
+            <a:r>
+              <a:rPr lang="en-GB" dirty="0"/>
+              <a:t>', 'Holiday', 'ID', '</a:t>
+            </a:r>
+            <a:r>
+              <a:rPr lang="en-GB" dirty="0" err="1"/>
+              <a:t>Wochentag</a:t>
+            </a:r>
+            <a:r>
+              <a:rPr lang="en-GB" dirty="0"/>
+              <a:t>', '</a:t>
+            </a:r>
+            <a:r>
+              <a:rPr lang="en-GB" dirty="0" err="1"/>
+              <a:t>Is_Weekend</a:t>
+            </a:r>
+            <a:r>
+              <a:rPr lang="en-GB" dirty="0"/>
+              <a:t>', '</a:t>
+            </a:r>
+            <a:r>
+              <a:rPr lang="en-GB" dirty="0" err="1"/>
+              <a:t>Weihnachten_Sommer</a:t>
+            </a:r>
+            <a:r>
+              <a:rPr lang="en-GB" dirty="0"/>
+              <a:t>', '</a:t>
+            </a:r>
+            <a:r>
+              <a:rPr lang="en-GB" dirty="0" err="1"/>
+              <a:t>Christmas_Sales</a:t>
+            </a:r>
+            <a:r>
+              <a:rPr lang="en-GB" dirty="0"/>
+              <a:t>', '</a:t>
+            </a:r>
+            <a:r>
+              <a:rPr lang="en-GB" dirty="0" err="1"/>
+              <a:t>Sommerferien_Flag</a:t>
+            </a:r>
+            <a:r>
+              <a:rPr lang="en-GB" dirty="0"/>
+              <a:t>', '</a:t>
+            </a:r>
+            <a:r>
+              <a:rPr lang="en-GB" dirty="0" err="1"/>
+              <a:t>Ferien_Category</a:t>
+            </a:r>
+            <a:r>
+              <a:rPr lang="en-GB" dirty="0"/>
+              <a:t>', '</a:t>
+            </a:r>
+            <a:r>
+              <a:rPr lang="en-GB" dirty="0" err="1"/>
+              <a:t>Temperature_Category</a:t>
+            </a:r>
+            <a:r>
+              <a:rPr lang="en-GB" dirty="0"/>
+              <a:t>', '</a:t>
+            </a:r>
+            <a:r>
+              <a:rPr lang="en-GB" dirty="0" err="1"/>
+              <a:t>Windgeschwindigkeit_Beaufort</a:t>
+            </a:r>
+            <a:r>
+              <a:rPr lang="en-GB" dirty="0"/>
+              <a:t>', '</a:t>
+            </a:r>
+            <a:r>
+              <a:rPr lang="en-GB" dirty="0" err="1"/>
+              <a:t>Rain_Status</a:t>
+            </a:r>
+            <a:r>
+              <a:rPr lang="en-GB" dirty="0"/>
+              <a:t>', '</a:t>
+            </a:r>
+            <a:r>
+              <a:rPr lang="en-GB" dirty="0" err="1"/>
+              <a:t>Cloud_Status</a:t>
+            </a:r>
+            <a:r>
+              <a:rPr lang="en-GB"/>
+              <a:t>',</a:t>
+            </a:r>
             <a:endParaRPr lang="de-DE"/>
           </a:p>
         </p:txBody>
@@ -12607,24 +12769,29 @@
             <p:ph type="title"/>
           </p:nvPr>
         </p:nvSpPr>
-        <p:spPr/>
+        <p:spPr>
+          <a:xfrm>
+            <a:off x="1159168" y="227900"/>
+            <a:ext cx="9905998" cy="1478570"/>
+          </a:xfrm>
+        </p:spPr>
         <p:txBody>
           <a:bodyPr/>
           <a:lstStyle/>
           <a:p>
             <a:r>
               <a:rPr lang="de-DE" dirty="0"/>
-              <a:t>Deskriptive Statistik</a:t>
+              <a:t>Beispiel: Umsätze Nach Ferien</a:t>
             </a:r>
           </a:p>
         </p:txBody>
       </p:sp>
       <p:sp>
         <p:nvSpPr>
-          <p:cNvPr id="3" name="Inhaltsplatzhalter 2">
+          <p:cNvPr id="8" name="Inhaltsplatzhalter 7">
             <a:extLst>
               <a:ext uri="{FF2B5EF4-FFF2-40B4-BE49-F238E27FC236}">
-                <a16:creationId xmlns:a16="http://schemas.microsoft.com/office/drawing/2014/main" id="{FEAFCF73-0018-4673-B629-7014E4B9C3C6}"/>
+                <a16:creationId xmlns:a16="http://schemas.microsoft.com/office/drawing/2014/main" id="{1B6CCA49-6AF6-4FF5-9ADD-A5541E36D8DF}"/>
               </a:ext>
             </a:extLst>
           </p:cNvPr>
@@ -12640,10 +12807,99 @@
           <a:bodyPr/>
           <a:lstStyle/>
           <a:p>
-            <a:endParaRPr lang="de-DE"/>
+            <a:endParaRPr lang="en-GB"/>
           </a:p>
         </p:txBody>
       </p:sp>
+      <p:pic>
+        <p:nvPicPr>
+          <p:cNvPr id="9" name="Grafik 8">
+            <a:extLst>
+              <a:ext uri="{FF2B5EF4-FFF2-40B4-BE49-F238E27FC236}">
+                <a16:creationId xmlns:a16="http://schemas.microsoft.com/office/drawing/2014/main" id="{8657C262-91D4-40E0-8868-4B258AA8D0BD}"/>
+              </a:ext>
+            </a:extLst>
+          </p:cNvPr>
+          <p:cNvPicPr>
+            <a:picLocks noChangeAspect="1"/>
+          </p:cNvPicPr>
+          <p:nvPr/>
+        </p:nvPicPr>
+        <p:blipFill>
+          <a:blip r:embed="rId2"/>
+          <a:stretch>
+            <a:fillRect/>
+          </a:stretch>
+        </p:blipFill>
+        <p:spPr>
+          <a:xfrm>
+            <a:off x="480669" y="1518083"/>
+            <a:ext cx="6529228" cy="4336740"/>
+          </a:xfrm>
+          <a:prstGeom prst="rect">
+            <a:avLst/>
+          </a:prstGeom>
+        </p:spPr>
+      </p:pic>
+      <p:pic>
+        <p:nvPicPr>
+          <p:cNvPr id="10" name="Grafik 9">
+            <a:extLst>
+              <a:ext uri="{FF2B5EF4-FFF2-40B4-BE49-F238E27FC236}">
+                <a16:creationId xmlns:a16="http://schemas.microsoft.com/office/drawing/2014/main" id="{300EA237-17E2-4F55-87CA-8DDDFC9E7926}"/>
+              </a:ext>
+            </a:extLst>
+          </p:cNvPr>
+          <p:cNvPicPr>
+            <a:picLocks noChangeAspect="1"/>
+          </p:cNvPicPr>
+          <p:nvPr/>
+        </p:nvPicPr>
+        <p:blipFill>
+          <a:blip r:embed="rId3"/>
+          <a:stretch>
+            <a:fillRect/>
+          </a:stretch>
+        </p:blipFill>
+        <p:spPr>
+          <a:xfrm>
+            <a:off x="7027872" y="1491448"/>
+            <a:ext cx="4639929" cy="3559946"/>
+          </a:xfrm>
+          <a:prstGeom prst="rect">
+            <a:avLst/>
+          </a:prstGeom>
+        </p:spPr>
+      </p:pic>
+      <p:pic>
+        <p:nvPicPr>
+          <p:cNvPr id="12" name="Grafik 11">
+            <a:extLst>
+              <a:ext uri="{FF2B5EF4-FFF2-40B4-BE49-F238E27FC236}">
+                <a16:creationId xmlns:a16="http://schemas.microsoft.com/office/drawing/2014/main" id="{BE1D365B-915D-4347-9E2A-1EA4DE1A8336}"/>
+              </a:ext>
+            </a:extLst>
+          </p:cNvPr>
+          <p:cNvPicPr>
+            <a:picLocks noChangeAspect="1"/>
+          </p:cNvPicPr>
+          <p:nvPr/>
+        </p:nvPicPr>
+        <p:blipFill rotWithShape="1">
+          <a:blip r:embed="rId4"/>
+          <a:srcRect l="36481" t="40333" r="32354" b="13657"/>
+          <a:stretch/>
+        </p:blipFill>
+        <p:spPr>
+          <a:xfrm>
+            <a:off x="6960093" y="4128116"/>
+            <a:ext cx="3530933" cy="2796465"/>
+          </a:xfrm>
+          <a:prstGeom prst="rect">
+            <a:avLst/>
+          </a:prstGeom>
+        </p:spPr>
+      </p:pic>
     </p:spTree>
     <p:extLst>
       <p:ext uri="{BB962C8B-B14F-4D97-AF65-F5344CB8AC3E}">
@@ -12658,6 +12914,183 @@
 </file>
 
 <file path=ppt/slides/slide4.xml><?xml version="1.0" encoding="utf-8"?>
+<p:sld xmlns:a="http://schemas.openxmlformats.org/drawingml/2006/main" xmlns:r="http://schemas.openxmlformats.org/officeDocument/2006/relationships" xmlns:p="http://schemas.openxmlformats.org/presentationml/2006/main">
+  <p:cSld>
+    <p:spTree>
+      <p:nvGrpSpPr>
+        <p:cNvPr id="1" name=""/>
+        <p:cNvGrpSpPr/>
+        <p:nvPr/>
+      </p:nvGrpSpPr>
+      <p:grpSpPr>
+        <a:xfrm>
+          <a:off x="0" y="0"/>
+          <a:ext cx="0" cy="0"/>
+          <a:chOff x="0" y="0"/>
+          <a:chExt cx="0" cy="0"/>
+        </a:xfrm>
+      </p:grpSpPr>
+      <p:sp>
+        <p:nvSpPr>
+          <p:cNvPr id="2" name="Titel 1">
+            <a:extLst>
+              <a:ext uri="{FF2B5EF4-FFF2-40B4-BE49-F238E27FC236}">
+                <a16:creationId xmlns:a16="http://schemas.microsoft.com/office/drawing/2014/main" id="{6A215070-F866-4B00-A585-AAD20E90A53F}"/>
+              </a:ext>
+            </a:extLst>
+          </p:cNvPr>
+          <p:cNvSpPr>
+            <a:spLocks noGrp="1"/>
+          </p:cNvSpPr>
+          <p:nvPr>
+            <p:ph type="title"/>
+          </p:nvPr>
+        </p:nvSpPr>
+        <p:spPr>
+          <a:xfrm>
+            <a:off x="1159168" y="227900"/>
+            <a:ext cx="9905998" cy="1478570"/>
+          </a:xfrm>
+        </p:spPr>
+        <p:txBody>
+          <a:bodyPr/>
+          <a:lstStyle/>
+          <a:p>
+            <a:r>
+              <a:rPr lang="de-DE" dirty="0"/>
+              <a:t>Beispiel: Umsätze Nach Bewölkung</a:t>
+            </a:r>
+          </a:p>
+        </p:txBody>
+      </p:sp>
+      <p:sp>
+        <p:nvSpPr>
+          <p:cNvPr id="5" name="Inhaltsplatzhalter 4">
+            <a:extLst>
+              <a:ext uri="{FF2B5EF4-FFF2-40B4-BE49-F238E27FC236}">
+                <a16:creationId xmlns:a16="http://schemas.microsoft.com/office/drawing/2014/main" id="{61CAEA8D-8912-4EC3-AF4E-57F5B1F4A470}"/>
+              </a:ext>
+            </a:extLst>
+          </p:cNvPr>
+          <p:cNvSpPr>
+            <a:spLocks noGrp="1"/>
+          </p:cNvSpPr>
+          <p:nvPr>
+            <p:ph idx="1"/>
+          </p:nvPr>
+        </p:nvSpPr>
+        <p:spPr/>
+        <p:txBody>
+          <a:bodyPr/>
+          <a:lstStyle/>
+          <a:p>
+            <a:endParaRPr lang="en-GB"/>
+          </a:p>
+        </p:txBody>
+      </p:sp>
+      <p:pic>
+        <p:nvPicPr>
+          <p:cNvPr id="9" name="Grafik 8">
+            <a:extLst>
+              <a:ext uri="{FF2B5EF4-FFF2-40B4-BE49-F238E27FC236}">
+                <a16:creationId xmlns:a16="http://schemas.microsoft.com/office/drawing/2014/main" id="{3D7D2748-4C60-4481-AFAF-E3BD086093B6}"/>
+              </a:ext>
+            </a:extLst>
+          </p:cNvPr>
+          <p:cNvPicPr>
+            <a:picLocks noChangeAspect="1"/>
+          </p:cNvPicPr>
+          <p:nvPr/>
+        </p:nvPicPr>
+        <p:blipFill>
+          <a:blip r:embed="rId2"/>
+          <a:stretch>
+            <a:fillRect/>
+          </a:stretch>
+        </p:blipFill>
+        <p:spPr>
+          <a:xfrm>
+            <a:off x="6172838" y="1376037"/>
+            <a:ext cx="4733140" cy="3084945"/>
+          </a:xfrm>
+          <a:prstGeom prst="rect">
+            <a:avLst/>
+          </a:prstGeom>
+        </p:spPr>
+      </p:pic>
+      <p:pic>
+        <p:nvPicPr>
+          <p:cNvPr id="10" name="Grafik 9">
+            <a:extLst>
+              <a:ext uri="{FF2B5EF4-FFF2-40B4-BE49-F238E27FC236}">
+                <a16:creationId xmlns:a16="http://schemas.microsoft.com/office/drawing/2014/main" id="{36A47A07-11B2-430B-A2F7-B5E5CA57794B}"/>
+              </a:ext>
+            </a:extLst>
+          </p:cNvPr>
+          <p:cNvPicPr>
+            <a:picLocks noChangeAspect="1"/>
+          </p:cNvPicPr>
+          <p:nvPr/>
+        </p:nvPicPr>
+        <p:blipFill>
+          <a:blip r:embed="rId3"/>
+          <a:stretch>
+            <a:fillRect/>
+          </a:stretch>
+        </p:blipFill>
+        <p:spPr>
+          <a:xfrm>
+            <a:off x="467649" y="1899821"/>
+            <a:ext cx="5702331" cy="3669618"/>
+          </a:xfrm>
+          <a:prstGeom prst="rect">
+            <a:avLst/>
+          </a:prstGeom>
+        </p:spPr>
+      </p:pic>
+      <p:pic>
+        <p:nvPicPr>
+          <p:cNvPr id="11" name="Grafik 10">
+            <a:extLst>
+              <a:ext uri="{FF2B5EF4-FFF2-40B4-BE49-F238E27FC236}">
+                <a16:creationId xmlns:a16="http://schemas.microsoft.com/office/drawing/2014/main" id="{9084E822-2230-4FE5-95C7-045EA2FCB29D}"/>
+              </a:ext>
+            </a:extLst>
+          </p:cNvPr>
+          <p:cNvPicPr>
+            <a:picLocks noChangeAspect="1"/>
+          </p:cNvPicPr>
+          <p:nvPr/>
+        </p:nvPicPr>
+        <p:blipFill rotWithShape="1">
+          <a:blip r:embed="rId4"/>
+          <a:srcRect l="30510" t="57160" r="38398" b="6192"/>
+          <a:stretch/>
+        </p:blipFill>
+        <p:spPr>
+          <a:xfrm>
+            <a:off x="6187737" y="4456591"/>
+            <a:ext cx="3615266" cy="2286000"/>
+          </a:xfrm>
+          <a:prstGeom prst="rect">
+            <a:avLst/>
+          </a:prstGeom>
+        </p:spPr>
+      </p:pic>
+    </p:spTree>
+    <p:extLst>
+      <p:ext uri="{BB962C8B-B14F-4D97-AF65-F5344CB8AC3E}">
+        <p14:creationId xmlns:p14="http://schemas.microsoft.com/office/powerpoint/2010/main" val="587417872"/>
+      </p:ext>
+    </p:extLst>
+  </p:cSld>
+  <p:clrMapOvr>
+    <a:masterClrMapping/>
+  </p:clrMapOvr>
+</p:sld>
+</file>
+
+<file path=ppt/slides/slide5.xml><?xml version="1.0" encoding="utf-8"?>
 <p:sld xmlns:a="http://schemas.openxmlformats.org/drawingml/2006/main" xmlns:r="http://schemas.openxmlformats.org/officeDocument/2006/relationships" xmlns:p="http://schemas.openxmlformats.org/presentationml/2006/main">
   <p:cSld>
     <p:spTree>
@@ -12740,7 +13173,7 @@
 </p:sld>
 </file>
 
-<file path=ppt/slides/slide5.xml><?xml version="1.0" encoding="utf-8"?>
+<file path=ppt/slides/slide6.xml><?xml version="1.0" encoding="utf-8"?>
 <p:sld xmlns:a="http://schemas.openxmlformats.org/drawingml/2006/main" xmlns:r="http://schemas.openxmlformats.org/officeDocument/2006/relationships" xmlns:p="http://schemas.openxmlformats.org/presentationml/2006/main">
   <p:cSld>
     <p:spTree>
@@ -12827,7 +13260,7 @@
 </p:sld>
 </file>
 
-<file path=ppt/slides/slide6.xml><?xml version="1.0" encoding="utf-8"?>
+<file path=ppt/slides/slide7.xml><?xml version="1.0" encoding="utf-8"?>
 <p:sld xmlns:a="http://schemas.openxmlformats.org/drawingml/2006/main" xmlns:r="http://schemas.openxmlformats.org/officeDocument/2006/relationships" xmlns:p="http://schemas.openxmlformats.org/presentationml/2006/main">
   <p:cSld>
     <p:spTree>
@@ -12910,7 +13343,7 @@
 </p:sld>
 </file>
 
-<file path=ppt/slides/slide7.xml><?xml version="1.0" encoding="utf-8"?>
+<file path=ppt/slides/slide8.xml><?xml version="1.0" encoding="utf-8"?>
 <p:sld xmlns:a="http://schemas.openxmlformats.org/drawingml/2006/main" xmlns:r="http://schemas.openxmlformats.org/officeDocument/2006/relationships" xmlns:p="http://schemas.openxmlformats.org/presentationml/2006/main">
   <p:cSld>
     <p:spTree>

</xml_diff>